<commit_message>
Adding support for Peninsula Templates
</commit_message>
<xml_diff>
--- a/WebContent/WEB-INF/templates/Peninsula/after_thought_for_the_day.pptx
+++ b/WebContent/WEB-INF/templates/Peninsula/after_thought_for_the_day.pptx
@@ -14331,13 +14331,9 @@
   <p:cSld>
     <p:bg>
       <p:bgPr>
-        <a:blipFill dpi="0" rotWithShape="1">
-          <a:blip r:embed="rId13"/>
-          <a:srcRect/>
-          <a:stretch>
-            <a:fillRect/>
-          </a:stretch>
-        </a:blipFill>
+        <a:solidFill>
+          <a:schemeClr val="bg1"/>
+        </a:solidFill>
         <a:effectLst/>
       </p:bgPr>
     </p:bg>
@@ -14848,13 +14844,9 @@
   <p:cSld>
     <p:bg>
       <p:bgPr>
-        <a:blipFill dpi="0" rotWithShape="1">
-          <a:blip r:embed="rId13"/>
-          <a:srcRect/>
-          <a:stretch>
-            <a:fillRect/>
-          </a:stretch>
-        </a:blipFill>
+        <a:solidFill>
+          <a:schemeClr val="bg1"/>
+        </a:solidFill>
         <a:effectLst/>
       </p:bgPr>
     </p:bg>
@@ -14881,7 +14873,7 @@
           <p:nvPr/>
         </p:nvPicPr>
         <p:blipFill>
-          <a:blip r:embed="rId14">
+          <a:blip r:embed="rId13">
             <a:lum bright="-16000"/>
             <a:extLst>
               <a:ext uri="{28A0092B-C50C-407E-A947-70E740481C1C}">
@@ -15814,13 +15806,9 @@
   <p:cSld>
     <p:bg>
       <p:bgPr>
-        <a:blipFill dpi="0" rotWithShape="1">
-          <a:blip r:embed="rId13"/>
-          <a:srcRect/>
-          <a:stretch>
-            <a:fillRect/>
-          </a:stretch>
-        </a:blipFill>
+        <a:solidFill>
+          <a:schemeClr val="bg1"/>
+        </a:solidFill>
         <a:effectLst/>
       </p:bgPr>
     </p:bg>
@@ -15847,7 +15835,7 @@
           <p:nvPr/>
         </p:nvPicPr>
         <p:blipFill>
-          <a:blip r:embed="rId14">
+          <a:blip r:embed="rId13">
             <a:lum bright="-16000"/>
             <a:extLst>
               <a:ext uri="{28A0092B-C50C-407E-A947-70E740481C1C}">
@@ -16780,13 +16768,9 @@
   <p:cSld>
     <p:bg>
       <p:bgPr>
-        <a:blipFill dpi="0" rotWithShape="1">
-          <a:blip r:embed="rId13"/>
-          <a:srcRect/>
-          <a:stretch>
-            <a:fillRect/>
-          </a:stretch>
-        </a:blipFill>
+        <a:solidFill>
+          <a:schemeClr val="bg1"/>
+        </a:solidFill>
         <a:effectLst/>
       </p:bgPr>
     </p:bg>
@@ -16813,7 +16797,7 @@
           <p:nvPr/>
         </p:nvPicPr>
         <p:blipFill>
-          <a:blip r:embed="rId14">
+          <a:blip r:embed="rId13">
             <a:lum bright="-16000"/>
             <a:extLst>
               <a:ext uri="{28A0092B-C50C-407E-A947-70E740481C1C}">
@@ -17743,13 +17727,9 @@
   <p:cSld>
     <p:bg>
       <p:bgPr>
-        <a:blipFill dpi="0" rotWithShape="1">
-          <a:blip r:embed="rId13"/>
-          <a:srcRect/>
-          <a:stretch>
-            <a:fillRect/>
-          </a:stretch>
-        </a:blipFill>
+        <a:solidFill>
+          <a:schemeClr val="bg1"/>
+        </a:solidFill>
         <a:effectLst/>
       </p:bgPr>
     </p:bg>
@@ -18926,14 +18906,44 @@
               <a:buSzPct val="100000"/>
             </a:pPr>
             <a:r>
-              <a:rPr lang="en-US" altLang="en-US" sz="4400" b="1" i="1">
+              <a:rPr lang="en-US" altLang="en-US" sz="4400" b="1" i="1" dirty="0" err="1">
                 <a:solidFill>
                   <a:srgbClr val="09FF01"/>
                 </a:solidFill>
                 <a:latin typeface="Times New Roman" pitchFamily="18" charset="0"/>
                 <a:ea typeface="MS PGothic" pitchFamily="34" charset="-128"/>
               </a:rPr>
-              <a:t>Sathya Sai Baba Center of Peninsula</a:t>
+              <a:t>Sathya</a:t>
+            </a:r>
+            <a:r>
+              <a:rPr lang="en-US" altLang="en-US" sz="4400" b="1" i="1" dirty="0">
+                <a:solidFill>
+                  <a:srgbClr val="09FF01"/>
+                </a:solidFill>
+                <a:latin typeface="Times New Roman" pitchFamily="18" charset="0"/>
+                <a:ea typeface="MS PGothic" pitchFamily="34" charset="-128"/>
+              </a:rPr>
+              <a:t> </a:t>
+            </a:r>
+            <a:r>
+              <a:rPr lang="en-US" altLang="en-US" sz="4400" b="1" i="1" dirty="0" err="1">
+                <a:solidFill>
+                  <a:srgbClr val="09FF01"/>
+                </a:solidFill>
+                <a:latin typeface="Times New Roman" pitchFamily="18" charset="0"/>
+                <a:ea typeface="MS PGothic" pitchFamily="34" charset="-128"/>
+              </a:rPr>
+              <a:t>Sai</a:t>
+            </a:r>
+            <a:r>
+              <a:rPr lang="en-US" altLang="en-US" sz="4400" b="1" i="1" dirty="0">
+                <a:solidFill>
+                  <a:srgbClr val="09FF01"/>
+                </a:solidFill>
+                <a:latin typeface="Times New Roman" pitchFamily="18" charset="0"/>
+                <a:ea typeface="MS PGothic" pitchFamily="34" charset="-128"/>
+              </a:rPr>
+              <a:t> Baba Center of Peninsula</a:t>
             </a:r>
           </a:p>
         </p:txBody>
@@ -19548,8 +19558,8 @@
         </p:blipFill>
         <p:spPr>
           <a:xfrm>
-            <a:off x="177800" y="0"/>
-            <a:ext cx="8777304" cy="6858000"/>
+            <a:off x="0" y="0"/>
+            <a:ext cx="9144000" cy="6858000"/>
           </a:xfrm>
           <a:prstGeom prst="rect">
             <a:avLst/>
@@ -19677,8 +19687,8 @@
         </p:blipFill>
         <p:spPr>
           <a:xfrm>
-            <a:off x="177800" y="0"/>
-            <a:ext cx="8777304" cy="6858000"/>
+            <a:off x="0" y="0"/>
+            <a:ext cx="9144000" cy="6858000"/>
           </a:xfrm>
           <a:prstGeom prst="rect">
             <a:avLst/>
@@ -20573,8 +20583,8 @@
         </p:blipFill>
         <p:spPr>
           <a:xfrm>
-            <a:off x="177800" y="0"/>
-            <a:ext cx="8777304" cy="6858000"/>
+            <a:off x="0" y="0"/>
+            <a:ext cx="9144000" cy="6858000"/>
           </a:xfrm>
           <a:prstGeom prst="rect">
             <a:avLst/>
@@ -21422,8 +21432,8 @@
         </p:blipFill>
         <p:spPr>
           <a:xfrm>
-            <a:off x="177800" y="0"/>
-            <a:ext cx="8777304" cy="6858000"/>
+            <a:off x="0" y="0"/>
+            <a:ext cx="9144000" cy="6858000"/>
           </a:xfrm>
           <a:prstGeom prst="rect">
             <a:avLst/>
@@ -21931,8 +21941,8 @@
         </p:blipFill>
         <p:spPr>
           <a:xfrm>
-            <a:off x="177800" y="0"/>
-            <a:ext cx="8777304" cy="6858000"/>
+            <a:off x="0" y="0"/>
+            <a:ext cx="9144000" cy="6858000"/>
           </a:xfrm>
           <a:prstGeom prst="rect">
             <a:avLst/>
@@ -22776,7 +22786,7 @@
         <p:spPr>
           <a:xfrm>
             <a:off x="0" y="0"/>
-            <a:ext cx="9144000" cy="6834507"/>
+            <a:ext cx="9144000" cy="6858000"/>
           </a:xfrm>
           <a:prstGeom prst="rect">
             <a:avLst/>
@@ -25558,7 +25568,7 @@
   <a:extraClrSchemeLst/>
   <a:extLst>
     <a:ext uri="{05A4C25C-085E-4340-85A3-A5531E510DB2}">
-      <thm15:themeFamily xmlns:thm15="http://schemas.microsoft.com/office/thememl/2012/main" xmlns="" name="Office Theme" id="{62F939B6-93AF-4DB8-9C6B-D6C7DFDC589F}" vid="{4A3C46E8-61CC-4603-A589-7422A47A8E4A}"/>
+      <thm15:themeFamily xmlns="" xmlns:thm15="http://schemas.microsoft.com/office/thememl/2012/main" name="Office Theme" id="{62F939B6-93AF-4DB8-9C6B-D6C7DFDC589F}" vid="{4A3C46E8-61CC-4603-A589-7422A47A8E4A}"/>
     </a:ext>
   </a:extLst>
 </a:theme>

</xml_diff>